<commit_message>
Update example to include paths.
</commit_message>
<xml_diff>
--- a/tests/sources/details_test0.pptx
+++ b/tests/sources/details_test0.pptx
@@ -210,7 +210,7 @@
           <a:p>
             <a:fld id="{28A6B6D9-41FF-694B-9E2C-02A8BC192467}" type="datetimeFigureOut">
               <a:rPr lang="en-US" smtClean="0"/>
-              <a:t>9/4/20</a:t>
+              <a:t>10/22/20</a:t>
             </a:fld>
             <a:endParaRPr lang="en-US"/>
           </a:p>
@@ -611,7 +611,7 @@
           <a:p>
             <a:r>
               <a:rPr lang="en-US" dirty="0"/>
-              <a:t>.id(hires) outline(a1)</a:t>
+              <a:t>.id(tissue) outline(tissue_1)</a:t>
             </a:r>
           </a:p>
         </p:txBody>
@@ -698,7 +698,7 @@
           <a:p>
             <a:r>
               <a:rPr lang="en-US" dirty="0"/>
-              <a:t>.id(super) outline(x)</a:t>
+              <a:t>.id(cell) outline(cell_1)</a:t>
             </a:r>
           </a:p>
         </p:txBody>
@@ -888,7 +888,7 @@
           <a:p>
             <a:fld id="{9B2C672E-4C60-BA40-A9EB-4E1C07F47054}" type="datetimeFigureOut">
               <a:rPr lang="en-US" smtClean="0"/>
-              <a:t>9/4/20</a:t>
+              <a:t>10/22/20</a:t>
             </a:fld>
             <a:endParaRPr lang="en-US"/>
           </a:p>
@@ -1088,7 +1088,7 @@
           <a:p>
             <a:fld id="{9B2C672E-4C60-BA40-A9EB-4E1C07F47054}" type="datetimeFigureOut">
               <a:rPr lang="en-US" smtClean="0"/>
-              <a:t>9/4/20</a:t>
+              <a:t>10/22/20</a:t>
             </a:fld>
             <a:endParaRPr lang="en-US"/>
           </a:p>
@@ -1298,7 +1298,7 @@
           <a:p>
             <a:fld id="{9B2C672E-4C60-BA40-A9EB-4E1C07F47054}" type="datetimeFigureOut">
               <a:rPr lang="en-US" smtClean="0"/>
-              <a:t>9/4/20</a:t>
+              <a:t>10/22/20</a:t>
             </a:fld>
             <a:endParaRPr lang="en-US"/>
           </a:p>
@@ -1498,7 +1498,7 @@
           <a:p>
             <a:fld id="{9B2C672E-4C60-BA40-A9EB-4E1C07F47054}" type="datetimeFigureOut">
               <a:rPr lang="en-US" smtClean="0"/>
-              <a:t>9/4/20</a:t>
+              <a:t>10/22/20</a:t>
             </a:fld>
             <a:endParaRPr lang="en-US"/>
           </a:p>
@@ -1774,7 +1774,7 @@
           <a:p>
             <a:fld id="{9B2C672E-4C60-BA40-A9EB-4E1C07F47054}" type="datetimeFigureOut">
               <a:rPr lang="en-US" smtClean="0"/>
-              <a:t>9/4/20</a:t>
+              <a:t>10/22/20</a:t>
             </a:fld>
             <a:endParaRPr lang="en-US"/>
           </a:p>
@@ -2042,7 +2042,7 @@
           <a:p>
             <a:fld id="{9B2C672E-4C60-BA40-A9EB-4E1C07F47054}" type="datetimeFigureOut">
               <a:rPr lang="en-US" smtClean="0"/>
-              <a:t>9/4/20</a:t>
+              <a:t>10/22/20</a:t>
             </a:fld>
             <a:endParaRPr lang="en-US"/>
           </a:p>
@@ -2457,7 +2457,7 @@
           <a:p>
             <a:fld id="{9B2C672E-4C60-BA40-A9EB-4E1C07F47054}" type="datetimeFigureOut">
               <a:rPr lang="en-US" smtClean="0"/>
-              <a:t>9/4/20</a:t>
+              <a:t>10/22/20</a:t>
             </a:fld>
             <a:endParaRPr lang="en-US"/>
           </a:p>
@@ -2599,7 +2599,7 @@
           <a:p>
             <a:fld id="{9B2C672E-4C60-BA40-A9EB-4E1C07F47054}" type="datetimeFigureOut">
               <a:rPr lang="en-US" smtClean="0"/>
-              <a:t>9/4/20</a:t>
+              <a:t>10/22/20</a:t>
             </a:fld>
             <a:endParaRPr lang="en-US"/>
           </a:p>
@@ -2712,7 +2712,7 @@
           <a:p>
             <a:fld id="{9B2C672E-4C60-BA40-A9EB-4E1C07F47054}" type="datetimeFigureOut">
               <a:rPr lang="en-US" smtClean="0"/>
-              <a:t>9/4/20</a:t>
+              <a:t>10/22/20</a:t>
             </a:fld>
             <a:endParaRPr lang="en-US"/>
           </a:p>
@@ -3025,7 +3025,7 @@
           <a:p>
             <a:fld id="{9B2C672E-4C60-BA40-A9EB-4E1C07F47054}" type="datetimeFigureOut">
               <a:rPr lang="en-US" smtClean="0"/>
-              <a:t>9/4/20</a:t>
+              <a:t>10/22/20</a:t>
             </a:fld>
             <a:endParaRPr lang="en-US"/>
           </a:p>
@@ -3314,7 +3314,7 @@
           <a:p>
             <a:fld id="{9B2C672E-4C60-BA40-A9EB-4E1C07F47054}" type="datetimeFigureOut">
               <a:rPr lang="en-US" smtClean="0"/>
-              <a:t>9/4/20</a:t>
+              <a:t>10/22/20</a:t>
             </a:fld>
             <a:endParaRPr lang="en-US"/>
           </a:p>
@@ -3557,7 +3557,7 @@
           <a:p>
             <a:fld id="{9B2C672E-4C60-BA40-A9EB-4E1C07F47054}" type="datetimeFigureOut">
               <a:rPr lang="en-US" smtClean="0"/>
-              <a:t>9/4/20</a:t>
+              <a:t>10/22/20</a:t>
             </a:fld>
             <a:endParaRPr lang="en-US"/>
           </a:p>
@@ -4129,7 +4129,7 @@
       </p:sp>
       <p:sp>
         <p:nvSpPr>
-          <p:cNvPr id="7" name=".id(lowres1) details(hires, 8)">
+          <p:cNvPr id="7" name=".id(lowres1) details(tissue, 8)">
             <a:extLst>
               <a:ext uri="{FF2B5EF4-FFF2-40B4-BE49-F238E27FC236}">
                 <a16:creationId xmlns:a16="http://schemas.microsoft.com/office/drawing/2014/main" id="{9A0448A4-787B-1743-8BD4-BB2C06889F3A}"/>
@@ -4524,6 +4524,1020 @@
           </a:p>
         </p:txBody>
       </p:sp>
+      <p:sp>
+        <p:nvSpPr>
+          <p:cNvPr id="12" name=".id(nerve_track_2)">
+            <a:extLst>
+              <a:ext uri="{FF2B5EF4-FFF2-40B4-BE49-F238E27FC236}">
+                <a16:creationId xmlns:a16="http://schemas.microsoft.com/office/drawing/2014/main" id="{67E9FB26-1996-4D48-87B5-5CAE477C96E5}"/>
+              </a:ext>
+            </a:extLst>
+          </p:cNvPr>
+          <p:cNvSpPr/>
+          <p:nvPr/>
+        </p:nvSpPr>
+        <p:spPr>
+          <a:xfrm>
+            <a:off x="7350124" y="1632927"/>
+            <a:ext cx="212725" cy="307975"/>
+          </a:xfrm>
+          <a:custGeom>
+            <a:avLst/>
+            <a:gdLst>
+              <a:gd name="connsiteX0" fmla="*/ 161925 w 212725"/>
+              <a:gd name="connsiteY0" fmla="*/ 307975 h 307975"/>
+              <a:gd name="connsiteX1" fmla="*/ 76200 w 212725"/>
+              <a:gd name="connsiteY1" fmla="*/ 209550 h 307975"/>
+              <a:gd name="connsiteX2" fmla="*/ 38100 w 212725"/>
+              <a:gd name="connsiteY2" fmla="*/ 155575 h 307975"/>
+              <a:gd name="connsiteX3" fmla="*/ 22225 w 212725"/>
+              <a:gd name="connsiteY3" fmla="*/ 107950 h 307975"/>
+              <a:gd name="connsiteX4" fmla="*/ 0 w 212725"/>
+              <a:gd name="connsiteY4" fmla="*/ 25400 h 307975"/>
+              <a:gd name="connsiteX5" fmla="*/ 66675 w 212725"/>
+              <a:gd name="connsiteY5" fmla="*/ 0 h 307975"/>
+              <a:gd name="connsiteX6" fmla="*/ 85725 w 212725"/>
+              <a:gd name="connsiteY6" fmla="*/ 85725 h 307975"/>
+              <a:gd name="connsiteX7" fmla="*/ 123825 w 212725"/>
+              <a:gd name="connsiteY7" fmla="*/ 12700 h 307975"/>
+              <a:gd name="connsiteX8" fmla="*/ 187325 w 212725"/>
+              <a:gd name="connsiteY8" fmla="*/ 28575 h 307975"/>
+              <a:gd name="connsiteX9" fmla="*/ 127000 w 212725"/>
+              <a:gd name="connsiteY9" fmla="*/ 155575 h 307975"/>
+              <a:gd name="connsiteX10" fmla="*/ 212725 w 212725"/>
+              <a:gd name="connsiteY10" fmla="*/ 263525 h 307975"/>
+              <a:gd name="connsiteX11" fmla="*/ 161925 w 212725"/>
+              <a:gd name="connsiteY11" fmla="*/ 307975 h 307975"/>
+              <a:gd name="connsiteX0" fmla="*/ 161925 w 212725"/>
+              <a:gd name="connsiteY0" fmla="*/ 307975 h 307975"/>
+              <a:gd name="connsiteX1" fmla="*/ 76200 w 212725"/>
+              <a:gd name="connsiteY1" fmla="*/ 209550 h 307975"/>
+              <a:gd name="connsiteX2" fmla="*/ 38100 w 212725"/>
+              <a:gd name="connsiteY2" fmla="*/ 155575 h 307975"/>
+              <a:gd name="connsiteX3" fmla="*/ 22225 w 212725"/>
+              <a:gd name="connsiteY3" fmla="*/ 107950 h 307975"/>
+              <a:gd name="connsiteX4" fmla="*/ 0 w 212725"/>
+              <a:gd name="connsiteY4" fmla="*/ 25400 h 307975"/>
+              <a:gd name="connsiteX5" fmla="*/ 66675 w 212725"/>
+              <a:gd name="connsiteY5" fmla="*/ 0 h 307975"/>
+              <a:gd name="connsiteX6" fmla="*/ 85725 w 212725"/>
+              <a:gd name="connsiteY6" fmla="*/ 85725 h 307975"/>
+              <a:gd name="connsiteX7" fmla="*/ 123825 w 212725"/>
+              <a:gd name="connsiteY7" fmla="*/ 12700 h 307975"/>
+              <a:gd name="connsiteX8" fmla="*/ 127000 w 212725"/>
+              <a:gd name="connsiteY8" fmla="*/ 155575 h 307975"/>
+              <a:gd name="connsiteX9" fmla="*/ 212725 w 212725"/>
+              <a:gd name="connsiteY9" fmla="*/ 263525 h 307975"/>
+              <a:gd name="connsiteX10" fmla="*/ 161925 w 212725"/>
+              <a:gd name="connsiteY10" fmla="*/ 307975 h 307975"/>
+              <a:gd name="connsiteX0" fmla="*/ 161925 w 212725"/>
+              <a:gd name="connsiteY0" fmla="*/ 307975 h 307975"/>
+              <a:gd name="connsiteX1" fmla="*/ 76200 w 212725"/>
+              <a:gd name="connsiteY1" fmla="*/ 209550 h 307975"/>
+              <a:gd name="connsiteX2" fmla="*/ 38100 w 212725"/>
+              <a:gd name="connsiteY2" fmla="*/ 155575 h 307975"/>
+              <a:gd name="connsiteX3" fmla="*/ 22225 w 212725"/>
+              <a:gd name="connsiteY3" fmla="*/ 107950 h 307975"/>
+              <a:gd name="connsiteX4" fmla="*/ 0 w 212725"/>
+              <a:gd name="connsiteY4" fmla="*/ 25400 h 307975"/>
+              <a:gd name="connsiteX5" fmla="*/ 66675 w 212725"/>
+              <a:gd name="connsiteY5" fmla="*/ 0 h 307975"/>
+              <a:gd name="connsiteX6" fmla="*/ 85725 w 212725"/>
+              <a:gd name="connsiteY6" fmla="*/ 85725 h 307975"/>
+              <a:gd name="connsiteX7" fmla="*/ 127000 w 212725"/>
+              <a:gd name="connsiteY7" fmla="*/ 155575 h 307975"/>
+              <a:gd name="connsiteX8" fmla="*/ 212725 w 212725"/>
+              <a:gd name="connsiteY8" fmla="*/ 263525 h 307975"/>
+              <a:gd name="connsiteX9" fmla="*/ 161925 w 212725"/>
+              <a:gd name="connsiteY9" fmla="*/ 307975 h 307975"/>
+            </a:gdLst>
+            <a:ahLst/>
+            <a:cxnLst>
+              <a:cxn ang="0">
+                <a:pos x="connsiteX0" y="connsiteY0"/>
+              </a:cxn>
+              <a:cxn ang="0">
+                <a:pos x="connsiteX1" y="connsiteY1"/>
+              </a:cxn>
+              <a:cxn ang="0">
+                <a:pos x="connsiteX2" y="connsiteY2"/>
+              </a:cxn>
+              <a:cxn ang="0">
+                <a:pos x="connsiteX3" y="connsiteY3"/>
+              </a:cxn>
+              <a:cxn ang="0">
+                <a:pos x="connsiteX4" y="connsiteY4"/>
+              </a:cxn>
+              <a:cxn ang="0">
+                <a:pos x="connsiteX5" y="connsiteY5"/>
+              </a:cxn>
+              <a:cxn ang="0">
+                <a:pos x="connsiteX6" y="connsiteY6"/>
+              </a:cxn>
+              <a:cxn ang="0">
+                <a:pos x="connsiteX7" y="connsiteY7"/>
+              </a:cxn>
+              <a:cxn ang="0">
+                <a:pos x="connsiteX8" y="connsiteY8"/>
+              </a:cxn>
+              <a:cxn ang="0">
+                <a:pos x="connsiteX9" y="connsiteY9"/>
+              </a:cxn>
+            </a:cxnLst>
+            <a:rect l="l" t="t" r="r" b="b"/>
+            <a:pathLst>
+              <a:path w="212725" h="307975">
+                <a:moveTo>
+                  <a:pt x="161925" y="307975"/>
+                </a:moveTo>
+                <a:lnTo>
+                  <a:pt x="76200" y="209550"/>
+                </a:lnTo>
+                <a:lnTo>
+                  <a:pt x="38100" y="155575"/>
+                </a:lnTo>
+                <a:lnTo>
+                  <a:pt x="22225" y="107950"/>
+                </a:lnTo>
+                <a:lnTo>
+                  <a:pt x="0" y="25400"/>
+                </a:lnTo>
+                <a:lnTo>
+                  <a:pt x="66675" y="0"/>
+                </a:lnTo>
+                <a:lnTo>
+                  <a:pt x="85725" y="85725"/>
+                </a:lnTo>
+                <a:lnTo>
+                  <a:pt x="127000" y="155575"/>
+                </a:lnTo>
+                <a:lnTo>
+                  <a:pt x="212725" y="263525"/>
+                </a:lnTo>
+                <a:lnTo>
+                  <a:pt x="161925" y="307975"/>
+                </a:lnTo>
+                <a:close/>
+              </a:path>
+            </a:pathLst>
+          </a:custGeom>
+          <a:noFill/>
+          <a:ln w="3175">
+            <a:solidFill>
+              <a:schemeClr val="bg2">
+                <a:lumMod val="90000"/>
+              </a:schemeClr>
+            </a:solidFill>
+          </a:ln>
+        </p:spPr>
+        <p:style>
+          <a:lnRef idx="2">
+            <a:schemeClr val="accent1">
+              <a:shade val="50000"/>
+            </a:schemeClr>
+          </a:lnRef>
+          <a:fillRef idx="1">
+            <a:schemeClr val="accent1"/>
+          </a:fillRef>
+          <a:effectRef idx="0">
+            <a:schemeClr val="accent1"/>
+          </a:effectRef>
+          <a:fontRef idx="minor">
+            <a:schemeClr val="lt1"/>
+          </a:fontRef>
+        </p:style>
+        <p:txBody>
+          <a:bodyPr rtlCol="0" anchor="ctr"/>
+          <a:lstStyle/>
+          <a:p>
+            <a:pPr algn="ctr"/>
+            <a:endParaRPr lang="en-US"/>
+          </a:p>
+        </p:txBody>
+      </p:sp>
+      <p:sp>
+        <p:nvSpPr>
+          <p:cNvPr id="16" name=".id(nerve_track_1)">
+            <a:extLst>
+              <a:ext uri="{FF2B5EF4-FFF2-40B4-BE49-F238E27FC236}">
+                <a16:creationId xmlns:a16="http://schemas.microsoft.com/office/drawing/2014/main" id="{49F5E2E5-8B17-5045-A752-61CB3C2D12B5}"/>
+              </a:ext>
+            </a:extLst>
+          </p:cNvPr>
+          <p:cNvSpPr/>
+          <p:nvPr/>
+        </p:nvSpPr>
+        <p:spPr>
+          <a:xfrm>
+            <a:off x="7435850" y="1639982"/>
+            <a:ext cx="101600" cy="142875"/>
+          </a:xfrm>
+          <a:custGeom>
+            <a:avLst/>
+            <a:gdLst>
+              <a:gd name="connsiteX0" fmla="*/ 161925 w 212725"/>
+              <a:gd name="connsiteY0" fmla="*/ 307975 h 307975"/>
+              <a:gd name="connsiteX1" fmla="*/ 76200 w 212725"/>
+              <a:gd name="connsiteY1" fmla="*/ 209550 h 307975"/>
+              <a:gd name="connsiteX2" fmla="*/ 38100 w 212725"/>
+              <a:gd name="connsiteY2" fmla="*/ 155575 h 307975"/>
+              <a:gd name="connsiteX3" fmla="*/ 22225 w 212725"/>
+              <a:gd name="connsiteY3" fmla="*/ 107950 h 307975"/>
+              <a:gd name="connsiteX4" fmla="*/ 0 w 212725"/>
+              <a:gd name="connsiteY4" fmla="*/ 25400 h 307975"/>
+              <a:gd name="connsiteX5" fmla="*/ 66675 w 212725"/>
+              <a:gd name="connsiteY5" fmla="*/ 0 h 307975"/>
+              <a:gd name="connsiteX6" fmla="*/ 85725 w 212725"/>
+              <a:gd name="connsiteY6" fmla="*/ 85725 h 307975"/>
+              <a:gd name="connsiteX7" fmla="*/ 123825 w 212725"/>
+              <a:gd name="connsiteY7" fmla="*/ 12700 h 307975"/>
+              <a:gd name="connsiteX8" fmla="*/ 187325 w 212725"/>
+              <a:gd name="connsiteY8" fmla="*/ 28575 h 307975"/>
+              <a:gd name="connsiteX9" fmla="*/ 127000 w 212725"/>
+              <a:gd name="connsiteY9" fmla="*/ 155575 h 307975"/>
+              <a:gd name="connsiteX10" fmla="*/ 212725 w 212725"/>
+              <a:gd name="connsiteY10" fmla="*/ 263525 h 307975"/>
+              <a:gd name="connsiteX11" fmla="*/ 161925 w 212725"/>
+              <a:gd name="connsiteY11" fmla="*/ 307975 h 307975"/>
+              <a:gd name="connsiteX0" fmla="*/ 212725 w 212725"/>
+              <a:gd name="connsiteY0" fmla="*/ 263525 h 263525"/>
+              <a:gd name="connsiteX1" fmla="*/ 76200 w 212725"/>
+              <a:gd name="connsiteY1" fmla="*/ 209550 h 263525"/>
+              <a:gd name="connsiteX2" fmla="*/ 38100 w 212725"/>
+              <a:gd name="connsiteY2" fmla="*/ 155575 h 263525"/>
+              <a:gd name="connsiteX3" fmla="*/ 22225 w 212725"/>
+              <a:gd name="connsiteY3" fmla="*/ 107950 h 263525"/>
+              <a:gd name="connsiteX4" fmla="*/ 0 w 212725"/>
+              <a:gd name="connsiteY4" fmla="*/ 25400 h 263525"/>
+              <a:gd name="connsiteX5" fmla="*/ 66675 w 212725"/>
+              <a:gd name="connsiteY5" fmla="*/ 0 h 263525"/>
+              <a:gd name="connsiteX6" fmla="*/ 85725 w 212725"/>
+              <a:gd name="connsiteY6" fmla="*/ 85725 h 263525"/>
+              <a:gd name="connsiteX7" fmla="*/ 123825 w 212725"/>
+              <a:gd name="connsiteY7" fmla="*/ 12700 h 263525"/>
+              <a:gd name="connsiteX8" fmla="*/ 187325 w 212725"/>
+              <a:gd name="connsiteY8" fmla="*/ 28575 h 263525"/>
+              <a:gd name="connsiteX9" fmla="*/ 127000 w 212725"/>
+              <a:gd name="connsiteY9" fmla="*/ 155575 h 263525"/>
+              <a:gd name="connsiteX10" fmla="*/ 212725 w 212725"/>
+              <a:gd name="connsiteY10" fmla="*/ 263525 h 263525"/>
+              <a:gd name="connsiteX0" fmla="*/ 127000 w 187325"/>
+              <a:gd name="connsiteY0" fmla="*/ 155575 h 209550"/>
+              <a:gd name="connsiteX1" fmla="*/ 76200 w 187325"/>
+              <a:gd name="connsiteY1" fmla="*/ 209550 h 209550"/>
+              <a:gd name="connsiteX2" fmla="*/ 38100 w 187325"/>
+              <a:gd name="connsiteY2" fmla="*/ 155575 h 209550"/>
+              <a:gd name="connsiteX3" fmla="*/ 22225 w 187325"/>
+              <a:gd name="connsiteY3" fmla="*/ 107950 h 209550"/>
+              <a:gd name="connsiteX4" fmla="*/ 0 w 187325"/>
+              <a:gd name="connsiteY4" fmla="*/ 25400 h 209550"/>
+              <a:gd name="connsiteX5" fmla="*/ 66675 w 187325"/>
+              <a:gd name="connsiteY5" fmla="*/ 0 h 209550"/>
+              <a:gd name="connsiteX6" fmla="*/ 85725 w 187325"/>
+              <a:gd name="connsiteY6" fmla="*/ 85725 h 209550"/>
+              <a:gd name="connsiteX7" fmla="*/ 123825 w 187325"/>
+              <a:gd name="connsiteY7" fmla="*/ 12700 h 209550"/>
+              <a:gd name="connsiteX8" fmla="*/ 187325 w 187325"/>
+              <a:gd name="connsiteY8" fmla="*/ 28575 h 209550"/>
+              <a:gd name="connsiteX9" fmla="*/ 127000 w 187325"/>
+              <a:gd name="connsiteY9" fmla="*/ 155575 h 209550"/>
+              <a:gd name="connsiteX0" fmla="*/ 127000 w 187325"/>
+              <a:gd name="connsiteY0" fmla="*/ 155575 h 155575"/>
+              <a:gd name="connsiteX1" fmla="*/ 38100 w 187325"/>
+              <a:gd name="connsiteY1" fmla="*/ 155575 h 155575"/>
+              <a:gd name="connsiteX2" fmla="*/ 22225 w 187325"/>
+              <a:gd name="connsiteY2" fmla="*/ 107950 h 155575"/>
+              <a:gd name="connsiteX3" fmla="*/ 0 w 187325"/>
+              <a:gd name="connsiteY3" fmla="*/ 25400 h 155575"/>
+              <a:gd name="connsiteX4" fmla="*/ 66675 w 187325"/>
+              <a:gd name="connsiteY4" fmla="*/ 0 h 155575"/>
+              <a:gd name="connsiteX5" fmla="*/ 85725 w 187325"/>
+              <a:gd name="connsiteY5" fmla="*/ 85725 h 155575"/>
+              <a:gd name="connsiteX6" fmla="*/ 123825 w 187325"/>
+              <a:gd name="connsiteY6" fmla="*/ 12700 h 155575"/>
+              <a:gd name="connsiteX7" fmla="*/ 187325 w 187325"/>
+              <a:gd name="connsiteY7" fmla="*/ 28575 h 155575"/>
+              <a:gd name="connsiteX8" fmla="*/ 127000 w 187325"/>
+              <a:gd name="connsiteY8" fmla="*/ 155575 h 155575"/>
+              <a:gd name="connsiteX0" fmla="*/ 127000 w 187325"/>
+              <a:gd name="connsiteY0" fmla="*/ 155575 h 155575"/>
+              <a:gd name="connsiteX1" fmla="*/ 22225 w 187325"/>
+              <a:gd name="connsiteY1" fmla="*/ 107950 h 155575"/>
+              <a:gd name="connsiteX2" fmla="*/ 0 w 187325"/>
+              <a:gd name="connsiteY2" fmla="*/ 25400 h 155575"/>
+              <a:gd name="connsiteX3" fmla="*/ 66675 w 187325"/>
+              <a:gd name="connsiteY3" fmla="*/ 0 h 155575"/>
+              <a:gd name="connsiteX4" fmla="*/ 85725 w 187325"/>
+              <a:gd name="connsiteY4" fmla="*/ 85725 h 155575"/>
+              <a:gd name="connsiteX5" fmla="*/ 123825 w 187325"/>
+              <a:gd name="connsiteY5" fmla="*/ 12700 h 155575"/>
+              <a:gd name="connsiteX6" fmla="*/ 187325 w 187325"/>
+              <a:gd name="connsiteY6" fmla="*/ 28575 h 155575"/>
+              <a:gd name="connsiteX7" fmla="*/ 127000 w 187325"/>
+              <a:gd name="connsiteY7" fmla="*/ 155575 h 155575"/>
+              <a:gd name="connsiteX0" fmla="*/ 127000 w 187325"/>
+              <a:gd name="connsiteY0" fmla="*/ 155575 h 155575"/>
+              <a:gd name="connsiteX1" fmla="*/ 0 w 187325"/>
+              <a:gd name="connsiteY1" fmla="*/ 25400 h 155575"/>
+              <a:gd name="connsiteX2" fmla="*/ 66675 w 187325"/>
+              <a:gd name="connsiteY2" fmla="*/ 0 h 155575"/>
+              <a:gd name="connsiteX3" fmla="*/ 85725 w 187325"/>
+              <a:gd name="connsiteY3" fmla="*/ 85725 h 155575"/>
+              <a:gd name="connsiteX4" fmla="*/ 123825 w 187325"/>
+              <a:gd name="connsiteY4" fmla="*/ 12700 h 155575"/>
+              <a:gd name="connsiteX5" fmla="*/ 187325 w 187325"/>
+              <a:gd name="connsiteY5" fmla="*/ 28575 h 155575"/>
+              <a:gd name="connsiteX6" fmla="*/ 127000 w 187325"/>
+              <a:gd name="connsiteY6" fmla="*/ 155575 h 155575"/>
+              <a:gd name="connsiteX0" fmla="*/ 60325 w 120650"/>
+              <a:gd name="connsiteY0" fmla="*/ 155575 h 155575"/>
+              <a:gd name="connsiteX1" fmla="*/ 0 w 120650"/>
+              <a:gd name="connsiteY1" fmla="*/ 0 h 155575"/>
+              <a:gd name="connsiteX2" fmla="*/ 19050 w 120650"/>
+              <a:gd name="connsiteY2" fmla="*/ 85725 h 155575"/>
+              <a:gd name="connsiteX3" fmla="*/ 57150 w 120650"/>
+              <a:gd name="connsiteY3" fmla="*/ 12700 h 155575"/>
+              <a:gd name="connsiteX4" fmla="*/ 120650 w 120650"/>
+              <a:gd name="connsiteY4" fmla="*/ 28575 h 155575"/>
+              <a:gd name="connsiteX5" fmla="*/ 60325 w 120650"/>
+              <a:gd name="connsiteY5" fmla="*/ 155575 h 155575"/>
+              <a:gd name="connsiteX0" fmla="*/ 41275 w 101600"/>
+              <a:gd name="connsiteY0" fmla="*/ 142875 h 142875"/>
+              <a:gd name="connsiteX1" fmla="*/ 0 w 101600"/>
+              <a:gd name="connsiteY1" fmla="*/ 73025 h 142875"/>
+              <a:gd name="connsiteX2" fmla="*/ 38100 w 101600"/>
+              <a:gd name="connsiteY2" fmla="*/ 0 h 142875"/>
+              <a:gd name="connsiteX3" fmla="*/ 101600 w 101600"/>
+              <a:gd name="connsiteY3" fmla="*/ 15875 h 142875"/>
+              <a:gd name="connsiteX4" fmla="*/ 41275 w 101600"/>
+              <a:gd name="connsiteY4" fmla="*/ 142875 h 142875"/>
+            </a:gdLst>
+            <a:ahLst/>
+            <a:cxnLst>
+              <a:cxn ang="0">
+                <a:pos x="connsiteX0" y="connsiteY0"/>
+              </a:cxn>
+              <a:cxn ang="0">
+                <a:pos x="connsiteX1" y="connsiteY1"/>
+              </a:cxn>
+              <a:cxn ang="0">
+                <a:pos x="connsiteX2" y="connsiteY2"/>
+              </a:cxn>
+              <a:cxn ang="0">
+                <a:pos x="connsiteX3" y="connsiteY3"/>
+              </a:cxn>
+              <a:cxn ang="0">
+                <a:pos x="connsiteX4" y="connsiteY4"/>
+              </a:cxn>
+            </a:cxnLst>
+            <a:rect l="l" t="t" r="r" b="b"/>
+            <a:pathLst>
+              <a:path w="101600" h="142875">
+                <a:moveTo>
+                  <a:pt x="41275" y="142875"/>
+                </a:moveTo>
+                <a:lnTo>
+                  <a:pt x="0" y="73025"/>
+                </a:lnTo>
+                <a:lnTo>
+                  <a:pt x="38100" y="0"/>
+                </a:lnTo>
+                <a:lnTo>
+                  <a:pt x="101600" y="15875"/>
+                </a:lnTo>
+                <a:lnTo>
+                  <a:pt x="41275" y="142875"/>
+                </a:lnTo>
+                <a:close/>
+              </a:path>
+            </a:pathLst>
+          </a:custGeom>
+          <a:noFill/>
+          <a:ln w="3175">
+            <a:solidFill>
+              <a:schemeClr val="bg2">
+                <a:lumMod val="90000"/>
+              </a:schemeClr>
+            </a:solidFill>
+          </a:ln>
+        </p:spPr>
+        <p:style>
+          <a:lnRef idx="2">
+            <a:schemeClr val="accent1">
+              <a:shade val="50000"/>
+            </a:schemeClr>
+          </a:lnRef>
+          <a:fillRef idx="1">
+            <a:schemeClr val="accent1"/>
+          </a:fillRef>
+          <a:effectRef idx="0">
+            <a:schemeClr val="accent1"/>
+          </a:effectRef>
+          <a:fontRef idx="minor">
+            <a:schemeClr val="lt1"/>
+          </a:fontRef>
+        </p:style>
+        <p:txBody>
+          <a:bodyPr rtlCol="0" anchor="ctr"/>
+          <a:lstStyle/>
+          <a:p>
+            <a:pPr algn="ctr"/>
+            <a:endParaRPr lang="en-US"/>
+          </a:p>
+        </p:txBody>
+      </p:sp>
+      <p:sp>
+        <p:nvSpPr>
+          <p:cNvPr id="3" name=".id(N1)">
+            <a:extLst>
+              <a:ext uri="{FF2B5EF4-FFF2-40B4-BE49-F238E27FC236}">
+                <a16:creationId xmlns:a16="http://schemas.microsoft.com/office/drawing/2014/main" id="{DFCBB51F-9D1B-BB43-9035-681220E9693C}"/>
+              </a:ext>
+            </a:extLst>
+          </p:cNvPr>
+          <p:cNvSpPr/>
+          <p:nvPr/>
+        </p:nvSpPr>
+        <p:spPr>
+          <a:xfrm>
+            <a:off x="7353142" y="1627708"/>
+            <a:ext cx="49324" cy="45719"/>
+          </a:xfrm>
+          <a:prstGeom prst="ellipse">
+            <a:avLst/>
+          </a:prstGeom>
+          <a:solidFill>
+            <a:srgbClr val="FF0000"/>
+          </a:solidFill>
+        </p:spPr>
+        <p:style>
+          <a:lnRef idx="2">
+            <a:schemeClr val="accent1">
+              <a:shade val="50000"/>
+            </a:schemeClr>
+          </a:lnRef>
+          <a:fillRef idx="1">
+            <a:schemeClr val="accent1"/>
+          </a:fillRef>
+          <a:effectRef idx="0">
+            <a:schemeClr val="accent1"/>
+          </a:effectRef>
+          <a:fontRef idx="minor">
+            <a:schemeClr val="lt1"/>
+          </a:fontRef>
+        </p:style>
+        <p:txBody>
+          <a:bodyPr rtlCol="0" anchor="ctr"/>
+          <a:lstStyle/>
+          <a:p>
+            <a:pPr algn="ctr"/>
+            <a:endParaRPr lang="en-US"/>
+          </a:p>
+        </p:txBody>
+      </p:sp>
+      <p:sp>
+        <p:nvSpPr>
+          <p:cNvPr id="5" name=".id(N2)">
+            <a:extLst>
+              <a:ext uri="{FF2B5EF4-FFF2-40B4-BE49-F238E27FC236}">
+                <a16:creationId xmlns:a16="http://schemas.microsoft.com/office/drawing/2014/main" id="{6E2D70B4-3981-8540-A12C-CF929D1D53E0}"/>
+              </a:ext>
+            </a:extLst>
+          </p:cNvPr>
+          <p:cNvSpPr/>
+          <p:nvPr/>
+        </p:nvSpPr>
+        <p:spPr>
+          <a:xfrm>
+            <a:off x="7469935" y="1627708"/>
+            <a:ext cx="49324" cy="45719"/>
+          </a:xfrm>
+          <a:prstGeom prst="ellipse">
+            <a:avLst/>
+          </a:prstGeom>
+          <a:solidFill>
+            <a:srgbClr val="FF0000"/>
+          </a:solidFill>
+        </p:spPr>
+        <p:style>
+          <a:lnRef idx="2">
+            <a:schemeClr val="accent1">
+              <a:shade val="50000"/>
+            </a:schemeClr>
+          </a:lnRef>
+          <a:fillRef idx="1">
+            <a:schemeClr val="accent1"/>
+          </a:fillRef>
+          <a:effectRef idx="0">
+            <a:schemeClr val="accent1"/>
+          </a:effectRef>
+          <a:fontRef idx="minor">
+            <a:schemeClr val="lt1"/>
+          </a:fontRef>
+        </p:style>
+        <p:txBody>
+          <a:bodyPr rtlCol="0" anchor="ctr"/>
+          <a:lstStyle/>
+          <a:p>
+            <a:pPr algn="ctr"/>
+            <a:endParaRPr lang="en-US"/>
+          </a:p>
+        </p:txBody>
+      </p:sp>
+      <p:sp>
+        <p:nvSpPr>
+          <p:cNvPr id="6" name=".id(N3)">
+            <a:extLst>
+              <a:ext uri="{FF2B5EF4-FFF2-40B4-BE49-F238E27FC236}">
+                <a16:creationId xmlns:a16="http://schemas.microsoft.com/office/drawing/2014/main" id="{69905168-7E14-3D47-B071-E853CCBBA6ED}"/>
+              </a:ext>
+            </a:extLst>
+          </p:cNvPr>
+          <p:cNvSpPr/>
+          <p:nvPr/>
+        </p:nvSpPr>
+        <p:spPr>
+          <a:xfrm>
+            <a:off x="7408617" y="1754963"/>
+            <a:ext cx="49324" cy="45719"/>
+          </a:xfrm>
+          <a:prstGeom prst="ellipse">
+            <a:avLst/>
+          </a:prstGeom>
+          <a:solidFill>
+            <a:srgbClr val="FF0000"/>
+          </a:solidFill>
+        </p:spPr>
+        <p:style>
+          <a:lnRef idx="2">
+            <a:schemeClr val="accent1">
+              <a:shade val="50000"/>
+            </a:schemeClr>
+          </a:lnRef>
+          <a:fillRef idx="1">
+            <a:schemeClr val="accent1"/>
+          </a:fillRef>
+          <a:effectRef idx="0">
+            <a:schemeClr val="accent1"/>
+          </a:effectRef>
+          <a:fontRef idx="minor">
+            <a:schemeClr val="lt1"/>
+          </a:fontRef>
+        </p:style>
+        <p:txBody>
+          <a:bodyPr rtlCol="0" anchor="ctr"/>
+          <a:lstStyle/>
+          <a:p>
+            <a:pPr algn="ctr"/>
+            <a:endParaRPr lang="en-US"/>
+          </a:p>
+        </p:txBody>
+      </p:sp>
+      <p:sp>
+        <p:nvSpPr>
+          <p:cNvPr id="30" name=".id(L1)">
+            <a:extLst>
+              <a:ext uri="{FF2B5EF4-FFF2-40B4-BE49-F238E27FC236}">
+                <a16:creationId xmlns:a16="http://schemas.microsoft.com/office/drawing/2014/main" id="{DF51B7BB-380A-8A49-847A-8CDD0DBFB82B}"/>
+              </a:ext>
+            </a:extLst>
+          </p:cNvPr>
+          <p:cNvSpPr/>
+          <p:nvPr/>
+        </p:nvSpPr>
+        <p:spPr>
+          <a:xfrm>
+            <a:off x="7375525" y="1641475"/>
+            <a:ext cx="161925" cy="273244"/>
+          </a:xfrm>
+          <a:custGeom>
+            <a:avLst/>
+            <a:gdLst>
+              <a:gd name="connsiteX0" fmla="*/ 0 w 155575"/>
+              <a:gd name="connsiteY0" fmla="*/ 0 h 269875"/>
+              <a:gd name="connsiteX1" fmla="*/ 47625 w 155575"/>
+              <a:gd name="connsiteY1" fmla="*/ 136525 h 269875"/>
+              <a:gd name="connsiteX2" fmla="*/ 155575 w 155575"/>
+              <a:gd name="connsiteY2" fmla="*/ 269875 h 269875"/>
+            </a:gdLst>
+            <a:ahLst/>
+            <a:cxnLst>
+              <a:cxn ang="0">
+                <a:pos x="connsiteX0" y="connsiteY0"/>
+              </a:cxn>
+              <a:cxn ang="0">
+                <a:pos x="connsiteX1" y="connsiteY1"/>
+              </a:cxn>
+              <a:cxn ang="0">
+                <a:pos x="connsiteX2" y="connsiteY2"/>
+              </a:cxn>
+            </a:cxnLst>
+            <a:rect l="l" t="t" r="r" b="b"/>
+            <a:pathLst>
+              <a:path w="155575" h="269875">
+                <a:moveTo>
+                  <a:pt x="0" y="0"/>
+                </a:moveTo>
+                <a:cubicBezTo>
+                  <a:pt x="10848" y="45773"/>
+                  <a:pt x="21696" y="91546"/>
+                  <a:pt x="47625" y="136525"/>
+                </a:cubicBezTo>
+                <a:cubicBezTo>
+                  <a:pt x="73554" y="181504"/>
+                  <a:pt x="114564" y="225689"/>
+                  <a:pt x="155575" y="269875"/>
+                </a:cubicBezTo>
+              </a:path>
+            </a:pathLst>
+          </a:custGeom>
+        </p:spPr>
+        <p:style>
+          <a:lnRef idx="1">
+            <a:schemeClr val="accent2"/>
+          </a:lnRef>
+          <a:fillRef idx="0">
+            <a:schemeClr val="accent2"/>
+          </a:fillRef>
+          <a:effectRef idx="0">
+            <a:schemeClr val="accent2"/>
+          </a:effectRef>
+          <a:fontRef idx="minor">
+            <a:schemeClr val="tx1"/>
+          </a:fontRef>
+        </p:style>
+        <p:txBody>
+          <a:bodyPr rtlCol="0" anchor="ctr"/>
+          <a:lstStyle/>
+          <a:p>
+            <a:pPr algn="ctr"/>
+            <a:endParaRPr lang="en-US"/>
+          </a:p>
+        </p:txBody>
+      </p:sp>
+      <p:sp>
+        <p:nvSpPr>
+          <p:cNvPr id="31" name=".id(L2)">
+            <a:extLst>
+              <a:ext uri="{FF2B5EF4-FFF2-40B4-BE49-F238E27FC236}">
+                <a16:creationId xmlns:a16="http://schemas.microsoft.com/office/drawing/2014/main" id="{66B18032-83A5-8748-ADE4-B5BE28D61439}"/>
+              </a:ext>
+            </a:extLst>
+          </p:cNvPr>
+          <p:cNvSpPr/>
+          <p:nvPr/>
+        </p:nvSpPr>
+        <p:spPr>
+          <a:xfrm>
+            <a:off x="7433280" y="1641474"/>
+            <a:ext cx="66070" cy="145441"/>
+          </a:xfrm>
+          <a:custGeom>
+            <a:avLst/>
+            <a:gdLst>
+              <a:gd name="connsiteX0" fmla="*/ 63500 w 63500"/>
+              <a:gd name="connsiteY0" fmla="*/ 0 h 127000"/>
+              <a:gd name="connsiteX1" fmla="*/ 0 w 63500"/>
+              <a:gd name="connsiteY1" fmla="*/ 127000 h 127000"/>
+            </a:gdLst>
+            <a:ahLst/>
+            <a:cxnLst>
+              <a:cxn ang="0">
+                <a:pos x="connsiteX0" y="connsiteY0"/>
+              </a:cxn>
+              <a:cxn ang="0">
+                <a:pos x="connsiteX1" y="connsiteY1"/>
+              </a:cxn>
+            </a:cxnLst>
+            <a:rect l="l" t="t" r="r" b="b"/>
+            <a:pathLst>
+              <a:path w="63500" h="127000">
+                <a:moveTo>
+                  <a:pt x="63500" y="0"/>
+                </a:moveTo>
+                <a:lnTo>
+                  <a:pt x="0" y="127000"/>
+                </a:lnTo>
+              </a:path>
+            </a:pathLst>
+          </a:custGeom>
+        </p:spPr>
+        <p:style>
+          <a:lnRef idx="1">
+            <a:schemeClr val="accent2"/>
+          </a:lnRef>
+          <a:fillRef idx="0">
+            <a:schemeClr val="accent2"/>
+          </a:fillRef>
+          <a:effectRef idx="0">
+            <a:schemeClr val="accent2"/>
+          </a:effectRef>
+          <a:fontRef idx="minor">
+            <a:schemeClr val="tx1"/>
+          </a:fontRef>
+        </p:style>
+        <p:txBody>
+          <a:bodyPr rtlCol="0" anchor="ctr"/>
+          <a:lstStyle/>
+          <a:p>
+            <a:pPr algn="ctr"/>
+            <a:endParaRPr lang="en-US"/>
+          </a:p>
+        </p:txBody>
+      </p:sp>
+      <p:sp>
+        <p:nvSpPr>
+          <p:cNvPr id="32" name=".id(nerve_1)">
+            <a:extLst>
+              <a:ext uri="{FF2B5EF4-FFF2-40B4-BE49-F238E27FC236}">
+                <a16:creationId xmlns:a16="http://schemas.microsoft.com/office/drawing/2014/main" id="{BC51F279-4079-3940-9A14-88D5A2A90CF3}"/>
+              </a:ext>
+            </a:extLst>
+          </p:cNvPr>
+          <p:cNvSpPr/>
+          <p:nvPr/>
+        </p:nvSpPr>
+        <p:spPr>
+          <a:xfrm rot="20257936">
+            <a:off x="7442445" y="1825832"/>
+            <a:ext cx="78752" cy="63735"/>
+          </a:xfrm>
+          <a:custGeom>
+            <a:avLst/>
+            <a:gdLst>
+              <a:gd name="connsiteX0" fmla="*/ 162774 w 735671"/>
+              <a:gd name="connsiteY0" fmla="*/ 291580 h 331685"/>
+              <a:gd name="connsiteX1" fmla="*/ 34437 w 735671"/>
+              <a:gd name="connsiteY1" fmla="*/ 2822 h 331685"/>
+              <a:gd name="connsiteX2" fmla="*/ 716226 w 735671"/>
+              <a:gd name="connsiteY2" fmla="*/ 155222 h 331685"/>
+              <a:gd name="connsiteX3" fmla="*/ 563826 w 735671"/>
+              <a:gd name="connsiteY3" fmla="*/ 331685 h 331685"/>
+              <a:gd name="connsiteX4" fmla="*/ 563826 w 735671"/>
+              <a:gd name="connsiteY4" fmla="*/ 331685 h 331685"/>
+              <a:gd name="connsiteX0" fmla="*/ 113490 w 682915"/>
+              <a:gd name="connsiteY0" fmla="*/ 275841 h 315946"/>
+              <a:gd name="connsiteX1" fmla="*/ 49322 w 682915"/>
+              <a:gd name="connsiteY1" fmla="*/ 3125 h 315946"/>
+              <a:gd name="connsiteX2" fmla="*/ 666942 w 682915"/>
+              <a:gd name="connsiteY2" fmla="*/ 139483 h 315946"/>
+              <a:gd name="connsiteX3" fmla="*/ 514542 w 682915"/>
+              <a:gd name="connsiteY3" fmla="*/ 315946 h 315946"/>
+              <a:gd name="connsiteX4" fmla="*/ 514542 w 682915"/>
+              <a:gd name="connsiteY4" fmla="*/ 315946 h 315946"/>
+              <a:gd name="connsiteX0" fmla="*/ 108782 w 620078"/>
+              <a:gd name="connsiteY0" fmla="*/ 283099 h 323204"/>
+              <a:gd name="connsiteX1" fmla="*/ 44614 w 620078"/>
+              <a:gd name="connsiteY1" fmla="*/ 10383 h 323204"/>
+              <a:gd name="connsiteX2" fmla="*/ 598066 w 620078"/>
+              <a:gd name="connsiteY2" fmla="*/ 82573 h 323204"/>
+              <a:gd name="connsiteX3" fmla="*/ 509834 w 620078"/>
+              <a:gd name="connsiteY3" fmla="*/ 323204 h 323204"/>
+              <a:gd name="connsiteX4" fmla="*/ 509834 w 620078"/>
+              <a:gd name="connsiteY4" fmla="*/ 323204 h 323204"/>
+              <a:gd name="connsiteX0" fmla="*/ 108782 w 632855"/>
+              <a:gd name="connsiteY0" fmla="*/ 293123 h 333228"/>
+              <a:gd name="connsiteX1" fmla="*/ 44614 w 632855"/>
+              <a:gd name="connsiteY1" fmla="*/ 20407 h 333228"/>
+              <a:gd name="connsiteX2" fmla="*/ 598066 w 632855"/>
+              <a:gd name="connsiteY2" fmla="*/ 92597 h 333228"/>
+              <a:gd name="connsiteX3" fmla="*/ 509834 w 632855"/>
+              <a:gd name="connsiteY3" fmla="*/ 333228 h 333228"/>
+              <a:gd name="connsiteX4" fmla="*/ 509834 w 632855"/>
+              <a:gd name="connsiteY4" fmla="*/ 333228 h 333228"/>
+              <a:gd name="connsiteX0" fmla="*/ 137111 w 661184"/>
+              <a:gd name="connsiteY0" fmla="*/ 339336 h 379441"/>
+              <a:gd name="connsiteX1" fmla="*/ 72943 w 661184"/>
+              <a:gd name="connsiteY1" fmla="*/ 66620 h 379441"/>
+              <a:gd name="connsiteX2" fmla="*/ 626395 w 661184"/>
+              <a:gd name="connsiteY2" fmla="*/ 138810 h 379441"/>
+              <a:gd name="connsiteX3" fmla="*/ 538163 w 661184"/>
+              <a:gd name="connsiteY3" fmla="*/ 379441 h 379441"/>
+              <a:gd name="connsiteX4" fmla="*/ 538163 w 661184"/>
+              <a:gd name="connsiteY4" fmla="*/ 379441 h 379441"/>
+              <a:gd name="connsiteX0" fmla="*/ 123295 w 647368"/>
+              <a:gd name="connsiteY0" fmla="*/ 339336 h 379441"/>
+              <a:gd name="connsiteX1" fmla="*/ 59127 w 647368"/>
+              <a:gd name="connsiteY1" fmla="*/ 66620 h 379441"/>
+              <a:gd name="connsiteX2" fmla="*/ 612579 w 647368"/>
+              <a:gd name="connsiteY2" fmla="*/ 138810 h 379441"/>
+              <a:gd name="connsiteX3" fmla="*/ 524347 w 647368"/>
+              <a:gd name="connsiteY3" fmla="*/ 379441 h 379441"/>
+              <a:gd name="connsiteX4" fmla="*/ 524347 w 647368"/>
+              <a:gd name="connsiteY4" fmla="*/ 379441 h 379441"/>
+              <a:gd name="connsiteX0" fmla="*/ 95228 w 619301"/>
+              <a:gd name="connsiteY0" fmla="*/ 303723 h 343828"/>
+              <a:gd name="connsiteX1" fmla="*/ 31060 w 619301"/>
+              <a:gd name="connsiteY1" fmla="*/ 31007 h 343828"/>
+              <a:gd name="connsiteX2" fmla="*/ 584512 w 619301"/>
+              <a:gd name="connsiteY2" fmla="*/ 79133 h 343828"/>
+              <a:gd name="connsiteX3" fmla="*/ 496280 w 619301"/>
+              <a:gd name="connsiteY3" fmla="*/ 343828 h 343828"/>
+              <a:gd name="connsiteX4" fmla="*/ 496280 w 619301"/>
+              <a:gd name="connsiteY4" fmla="*/ 343828 h 343828"/>
+              <a:gd name="connsiteX0" fmla="*/ 95228 w 632588"/>
+              <a:gd name="connsiteY0" fmla="*/ 328003 h 368108"/>
+              <a:gd name="connsiteX1" fmla="*/ 31060 w 632588"/>
+              <a:gd name="connsiteY1" fmla="*/ 55287 h 368108"/>
+              <a:gd name="connsiteX2" fmla="*/ 584512 w 632588"/>
+              <a:gd name="connsiteY2" fmla="*/ 103413 h 368108"/>
+              <a:gd name="connsiteX3" fmla="*/ 496280 w 632588"/>
+              <a:gd name="connsiteY3" fmla="*/ 368108 h 368108"/>
+              <a:gd name="connsiteX4" fmla="*/ 496280 w 632588"/>
+              <a:gd name="connsiteY4" fmla="*/ 368108 h 368108"/>
+              <a:gd name="connsiteX0" fmla="*/ 95228 w 603459"/>
+              <a:gd name="connsiteY0" fmla="*/ 334552 h 374657"/>
+              <a:gd name="connsiteX1" fmla="*/ 31060 w 603459"/>
+              <a:gd name="connsiteY1" fmla="*/ 61836 h 374657"/>
+              <a:gd name="connsiteX2" fmla="*/ 584512 w 603459"/>
+              <a:gd name="connsiteY2" fmla="*/ 109962 h 374657"/>
+              <a:gd name="connsiteX3" fmla="*/ 496280 w 603459"/>
+              <a:gd name="connsiteY3" fmla="*/ 374657 h 374657"/>
+              <a:gd name="connsiteX4" fmla="*/ 496280 w 603459"/>
+              <a:gd name="connsiteY4" fmla="*/ 374657 h 374657"/>
+              <a:gd name="connsiteX0" fmla="*/ 98708 w 606939"/>
+              <a:gd name="connsiteY0" fmla="*/ 369972 h 410077"/>
+              <a:gd name="connsiteX1" fmla="*/ 34540 w 606939"/>
+              <a:gd name="connsiteY1" fmla="*/ 97256 h 410077"/>
+              <a:gd name="connsiteX2" fmla="*/ 587992 w 606939"/>
+              <a:gd name="connsiteY2" fmla="*/ 145382 h 410077"/>
+              <a:gd name="connsiteX3" fmla="*/ 499760 w 606939"/>
+              <a:gd name="connsiteY3" fmla="*/ 410077 h 410077"/>
+              <a:gd name="connsiteX4" fmla="*/ 499760 w 606939"/>
+              <a:gd name="connsiteY4" fmla="*/ 410077 h 410077"/>
+              <a:gd name="connsiteX0" fmla="*/ 98708 w 606003"/>
+              <a:gd name="connsiteY0" fmla="*/ 369972 h 410118"/>
+              <a:gd name="connsiteX1" fmla="*/ 34540 w 606003"/>
+              <a:gd name="connsiteY1" fmla="*/ 97256 h 410118"/>
+              <a:gd name="connsiteX2" fmla="*/ 587992 w 606003"/>
+              <a:gd name="connsiteY2" fmla="*/ 145382 h 410118"/>
+              <a:gd name="connsiteX3" fmla="*/ 499760 w 606003"/>
+              <a:gd name="connsiteY3" fmla="*/ 410077 h 410118"/>
+              <a:gd name="connsiteX4" fmla="*/ 564551 w 606003"/>
+              <a:gd name="connsiteY4" fmla="*/ 163666 h 410118"/>
+              <a:gd name="connsiteX0" fmla="*/ 98708 w 606003"/>
+              <a:gd name="connsiteY0" fmla="*/ 369972 h 410077"/>
+              <a:gd name="connsiteX1" fmla="*/ 34540 w 606003"/>
+              <a:gd name="connsiteY1" fmla="*/ 97256 h 410077"/>
+              <a:gd name="connsiteX2" fmla="*/ 587992 w 606003"/>
+              <a:gd name="connsiteY2" fmla="*/ 145382 h 410077"/>
+              <a:gd name="connsiteX3" fmla="*/ 499760 w 606003"/>
+              <a:gd name="connsiteY3" fmla="*/ 410077 h 410077"/>
+              <a:gd name="connsiteX0" fmla="*/ 98708 w 595966"/>
+              <a:gd name="connsiteY0" fmla="*/ 375385 h 415490"/>
+              <a:gd name="connsiteX1" fmla="*/ 34540 w 595966"/>
+              <a:gd name="connsiteY1" fmla="*/ 102669 h 415490"/>
+              <a:gd name="connsiteX2" fmla="*/ 587992 w 595966"/>
+              <a:gd name="connsiteY2" fmla="*/ 150795 h 415490"/>
+              <a:gd name="connsiteX3" fmla="*/ 499760 w 595966"/>
+              <a:gd name="connsiteY3" fmla="*/ 415490 h 415490"/>
+              <a:gd name="connsiteX0" fmla="*/ 98708 w 599304"/>
+              <a:gd name="connsiteY0" fmla="*/ 355111 h 395216"/>
+              <a:gd name="connsiteX1" fmla="*/ 34540 w 599304"/>
+              <a:gd name="connsiteY1" fmla="*/ 82395 h 395216"/>
+              <a:gd name="connsiteX2" fmla="*/ 587992 w 599304"/>
+              <a:gd name="connsiteY2" fmla="*/ 130521 h 395216"/>
+              <a:gd name="connsiteX3" fmla="*/ 499760 w 599304"/>
+              <a:gd name="connsiteY3" fmla="*/ 395216 h 395216"/>
+              <a:gd name="connsiteX0" fmla="*/ 98708 w 601213"/>
+              <a:gd name="connsiteY0" fmla="*/ 362631 h 402736"/>
+              <a:gd name="connsiteX1" fmla="*/ 34540 w 601213"/>
+              <a:gd name="connsiteY1" fmla="*/ 89915 h 402736"/>
+              <a:gd name="connsiteX2" fmla="*/ 587992 w 601213"/>
+              <a:gd name="connsiteY2" fmla="*/ 138041 h 402736"/>
+              <a:gd name="connsiteX3" fmla="*/ 499760 w 601213"/>
+              <a:gd name="connsiteY3" fmla="*/ 402736 h 402736"/>
+              <a:gd name="connsiteX0" fmla="*/ 98708 w 601406"/>
+              <a:gd name="connsiteY0" fmla="*/ 332398 h 403027"/>
+              <a:gd name="connsiteX1" fmla="*/ 34540 w 601406"/>
+              <a:gd name="connsiteY1" fmla="*/ 59682 h 403027"/>
+              <a:gd name="connsiteX2" fmla="*/ 587992 w 601406"/>
+              <a:gd name="connsiteY2" fmla="*/ 107808 h 403027"/>
+              <a:gd name="connsiteX3" fmla="*/ 441082 w 601406"/>
+              <a:gd name="connsiteY3" fmla="*/ 403027 h 403027"/>
+              <a:gd name="connsiteX0" fmla="*/ 98708 w 593895"/>
+              <a:gd name="connsiteY0" fmla="*/ 381447 h 452076"/>
+              <a:gd name="connsiteX1" fmla="*/ 34540 w 593895"/>
+              <a:gd name="connsiteY1" fmla="*/ 108731 h 452076"/>
+              <a:gd name="connsiteX2" fmla="*/ 587992 w 593895"/>
+              <a:gd name="connsiteY2" fmla="*/ 156857 h 452076"/>
+              <a:gd name="connsiteX3" fmla="*/ 441082 w 593895"/>
+              <a:gd name="connsiteY3" fmla="*/ 452076 h 452076"/>
+              <a:gd name="connsiteX0" fmla="*/ 98708 w 606638"/>
+              <a:gd name="connsiteY0" fmla="*/ 331451 h 375287"/>
+              <a:gd name="connsiteX1" fmla="*/ 34540 w 606638"/>
+              <a:gd name="connsiteY1" fmla="*/ 58735 h 375287"/>
+              <a:gd name="connsiteX2" fmla="*/ 587992 w 606638"/>
+              <a:gd name="connsiteY2" fmla="*/ 106861 h 375287"/>
+              <a:gd name="connsiteX3" fmla="*/ 484158 w 606638"/>
+              <a:gd name="connsiteY3" fmla="*/ 375287 h 375287"/>
+              <a:gd name="connsiteX0" fmla="*/ 95767 w 610565"/>
+              <a:gd name="connsiteY0" fmla="*/ 281909 h 325745"/>
+              <a:gd name="connsiteX1" fmla="*/ 31599 w 610565"/>
+              <a:gd name="connsiteY1" fmla="*/ 9193 h 325745"/>
+              <a:gd name="connsiteX2" fmla="*/ 592512 w 610565"/>
+              <a:gd name="connsiteY2" fmla="*/ 88524 h 325745"/>
+              <a:gd name="connsiteX3" fmla="*/ 481217 w 610565"/>
+              <a:gd name="connsiteY3" fmla="*/ 325745 h 325745"/>
+              <a:gd name="connsiteX0" fmla="*/ 95767 w 615570"/>
+              <a:gd name="connsiteY0" fmla="*/ 325733 h 369569"/>
+              <a:gd name="connsiteX1" fmla="*/ 31599 w 615570"/>
+              <a:gd name="connsiteY1" fmla="*/ 53017 h 369569"/>
+              <a:gd name="connsiteX2" fmla="*/ 592512 w 615570"/>
+              <a:gd name="connsiteY2" fmla="*/ 132348 h 369569"/>
+              <a:gd name="connsiteX3" fmla="*/ 481217 w 615570"/>
+              <a:gd name="connsiteY3" fmla="*/ 369569 h 369569"/>
+              <a:gd name="connsiteX0" fmla="*/ 111598 w 631401"/>
+              <a:gd name="connsiteY0" fmla="*/ 374646 h 418482"/>
+              <a:gd name="connsiteX1" fmla="*/ 47430 w 631401"/>
+              <a:gd name="connsiteY1" fmla="*/ 101930 h 418482"/>
+              <a:gd name="connsiteX2" fmla="*/ 608343 w 631401"/>
+              <a:gd name="connsiteY2" fmla="*/ 181261 h 418482"/>
+              <a:gd name="connsiteX3" fmla="*/ 497048 w 631401"/>
+              <a:gd name="connsiteY3" fmla="*/ 418482 h 418482"/>
+            </a:gdLst>
+            <a:ahLst/>
+            <a:cxnLst>
+              <a:cxn ang="0">
+                <a:pos x="connsiteX0" y="connsiteY0"/>
+              </a:cxn>
+              <a:cxn ang="0">
+                <a:pos x="connsiteX1" y="connsiteY1"/>
+              </a:cxn>
+              <a:cxn ang="0">
+                <a:pos x="connsiteX2" y="connsiteY2"/>
+              </a:cxn>
+              <a:cxn ang="0">
+                <a:pos x="connsiteX3" y="connsiteY3"/>
+              </a:cxn>
+            </a:cxnLst>
+            <a:rect l="l" t="t" r="r" b="b"/>
+            <a:pathLst>
+              <a:path w="631401" h="418482">
+                <a:moveTo>
+                  <a:pt x="111598" y="374646"/>
+                </a:moveTo>
+                <a:cubicBezTo>
+                  <a:pt x="65477" y="345904"/>
+                  <a:pt x="-71657" y="258298"/>
+                  <a:pt x="47430" y="101930"/>
+                </a:cubicBezTo>
+                <a:cubicBezTo>
+                  <a:pt x="166517" y="-54438"/>
+                  <a:pt x="519507" y="-33117"/>
+                  <a:pt x="608343" y="181261"/>
+                </a:cubicBezTo>
+                <a:cubicBezTo>
+                  <a:pt x="697179" y="395639"/>
+                  <a:pt x="500955" y="415435"/>
+                  <a:pt x="497048" y="418482"/>
+                </a:cubicBezTo>
+              </a:path>
+            </a:pathLst>
+          </a:custGeom>
+          <a:noFill/>
+          <a:ln w="12700">
+            <a:solidFill>
+              <a:schemeClr val="tx1">
+                <a:lumMod val="65000"/>
+                <a:lumOff val="35000"/>
+              </a:schemeClr>
+            </a:solidFill>
+            <a:prstDash val="sysDash"/>
+          </a:ln>
+        </p:spPr>
+        <p:style>
+          <a:lnRef idx="2">
+            <a:schemeClr val="accent1">
+              <a:shade val="50000"/>
+            </a:schemeClr>
+          </a:lnRef>
+          <a:fillRef idx="1">
+            <a:schemeClr val="accent1"/>
+          </a:fillRef>
+          <a:effectRef idx="0">
+            <a:schemeClr val="accent1"/>
+          </a:effectRef>
+          <a:fontRef idx="minor">
+            <a:schemeClr val="lt1"/>
+          </a:fontRef>
+        </p:style>
+        <p:txBody>
+          <a:bodyPr rtlCol="0" anchor="ctr"/>
+          <a:lstStyle/>
+          <a:p>
+            <a:pPr algn="ctr"/>
+            <a:endParaRPr lang="en-NZ">
+              <a:solidFill>
+                <a:schemeClr val="tx1">
+                  <a:lumMod val="50000"/>
+                  <a:lumOff val="50000"/>
+                </a:schemeClr>
+              </a:solidFill>
+            </a:endParaRPr>
+          </a:p>
+        </p:txBody>
+      </p:sp>
     </p:spTree>
     <p:extLst>
       <p:ext uri="{BB962C8B-B14F-4D97-AF65-F5344CB8AC3E}">
@@ -4556,7 +5570,7 @@
       </p:grpSpPr>
       <p:sp>
         <p:nvSpPr>
-          <p:cNvPr id="2" name=".id(a1)">
+          <p:cNvPr id="2" name=".id(tissue_1)">
             <a:extLst>
               <a:ext uri="{FF2B5EF4-FFF2-40B4-BE49-F238E27FC236}">
                 <a16:creationId xmlns:a16="http://schemas.microsoft.com/office/drawing/2014/main" id="{1B7FAEA9-0041-CB42-B702-9A340BA6E54F}"/>
@@ -4952,7 +5966,7 @@
       </p:sp>
       <p:sp>
         <p:nvSpPr>
-          <p:cNvPr id="17" name=".details(super, 10)">
+          <p:cNvPr id="17" name=".details(cell, 10)">
             <a:extLst>
               <a:ext uri="{FF2B5EF4-FFF2-40B4-BE49-F238E27FC236}">
                 <a16:creationId xmlns:a16="http://schemas.microsoft.com/office/drawing/2014/main" id="{870CDF88-151F-4F45-AA6C-22F381B72E78}"/>
@@ -5207,7 +6221,7 @@
       </p:sp>
       <p:sp>
         <p:nvSpPr>
-          <p:cNvPr id="16" name=".details(super, 10)">
+          <p:cNvPr id="16" name=".details(cell, 10)">
             <a:extLst>
               <a:ext uri="{FF2B5EF4-FFF2-40B4-BE49-F238E27FC236}">
                 <a16:creationId xmlns:a16="http://schemas.microsoft.com/office/drawing/2014/main" id="{56EF4D3E-257A-4D49-910F-DDB8F243F6D0}"/>
@@ -5460,6 +6474,138 @@
           </a:p>
         </p:txBody>
       </p:sp>
+      <p:sp>
+        <p:nvSpPr>
+          <p:cNvPr id="5" name=".id(N4)">
+            <a:extLst>
+              <a:ext uri="{FF2B5EF4-FFF2-40B4-BE49-F238E27FC236}">
+                <a16:creationId xmlns:a16="http://schemas.microsoft.com/office/drawing/2014/main" id="{8112E80E-5EEC-4A40-8D7B-A5B6F4DD51BA}"/>
+              </a:ext>
+            </a:extLst>
+          </p:cNvPr>
+          <p:cNvSpPr/>
+          <p:nvPr/>
+        </p:nvSpPr>
+        <p:spPr>
+          <a:xfrm flipH="1">
+            <a:off x="3725950" y="2668109"/>
+            <a:ext cx="222528" cy="179614"/>
+          </a:xfrm>
+          <a:prstGeom prst="ellipse">
+            <a:avLst/>
+          </a:prstGeom>
+          <a:solidFill>
+            <a:srgbClr val="FF0000"/>
+          </a:solidFill>
+        </p:spPr>
+        <p:style>
+          <a:lnRef idx="2">
+            <a:schemeClr val="accent1">
+              <a:shade val="50000"/>
+            </a:schemeClr>
+          </a:lnRef>
+          <a:fillRef idx="1">
+            <a:schemeClr val="accent1"/>
+          </a:fillRef>
+          <a:effectRef idx="0">
+            <a:schemeClr val="accent1"/>
+          </a:effectRef>
+          <a:fontRef idx="minor">
+            <a:schemeClr val="lt1"/>
+          </a:fontRef>
+        </p:style>
+        <p:txBody>
+          <a:bodyPr rtlCol="0" anchor="ctr"/>
+          <a:lstStyle/>
+          <a:p>
+            <a:pPr algn="ctr"/>
+            <a:endParaRPr lang="en-US"/>
+          </a:p>
+        </p:txBody>
+      </p:sp>
+      <p:sp>
+        <p:nvSpPr>
+          <p:cNvPr id="3" name=".id(L3)">
+            <a:extLst>
+              <a:ext uri="{FF2B5EF4-FFF2-40B4-BE49-F238E27FC236}">
+                <a16:creationId xmlns:a16="http://schemas.microsoft.com/office/drawing/2014/main" id="{DB486EC1-3BCB-FB4B-86C0-7C25830D88C0}"/>
+              </a:ext>
+            </a:extLst>
+          </p:cNvPr>
+          <p:cNvSpPr/>
+          <p:nvPr/>
+        </p:nvSpPr>
+        <p:spPr>
+          <a:xfrm>
+            <a:off x="3347357" y="2547257"/>
+            <a:ext cx="979714" cy="636814"/>
+          </a:xfrm>
+          <a:custGeom>
+            <a:avLst/>
+            <a:gdLst>
+              <a:gd name="connsiteX0" fmla="*/ 0 w 375557"/>
+              <a:gd name="connsiteY0" fmla="*/ 0 h 1420585"/>
+              <a:gd name="connsiteX1" fmla="*/ 261257 w 375557"/>
+              <a:gd name="connsiteY1" fmla="*/ 702128 h 1420585"/>
+              <a:gd name="connsiteX2" fmla="*/ 375557 w 375557"/>
+              <a:gd name="connsiteY2" fmla="*/ 1420585 h 1420585"/>
+            </a:gdLst>
+            <a:ahLst/>
+            <a:cxnLst>
+              <a:cxn ang="0">
+                <a:pos x="connsiteX0" y="connsiteY0"/>
+              </a:cxn>
+              <a:cxn ang="0">
+                <a:pos x="connsiteX1" y="connsiteY1"/>
+              </a:cxn>
+              <a:cxn ang="0">
+                <a:pos x="connsiteX2" y="connsiteY2"/>
+              </a:cxn>
+            </a:cxnLst>
+            <a:rect l="l" t="t" r="r" b="b"/>
+            <a:pathLst>
+              <a:path w="375557" h="1420585">
+                <a:moveTo>
+                  <a:pt x="0" y="0"/>
+                </a:moveTo>
+                <a:cubicBezTo>
+                  <a:pt x="99332" y="232682"/>
+                  <a:pt x="198664" y="465364"/>
+                  <a:pt x="261257" y="702128"/>
+                </a:cubicBezTo>
+                <a:cubicBezTo>
+                  <a:pt x="323850" y="938892"/>
+                  <a:pt x="349703" y="1179738"/>
+                  <a:pt x="375557" y="1420585"/>
+                </a:cubicBezTo>
+              </a:path>
+            </a:pathLst>
+          </a:custGeom>
+          <a:ln w="28575"/>
+        </p:spPr>
+        <p:style>
+          <a:lnRef idx="1">
+            <a:schemeClr val="accent2"/>
+          </a:lnRef>
+          <a:fillRef idx="0">
+            <a:schemeClr val="accent2"/>
+          </a:fillRef>
+          <a:effectRef idx="0">
+            <a:schemeClr val="accent2"/>
+          </a:effectRef>
+          <a:fontRef idx="minor">
+            <a:schemeClr val="tx1"/>
+          </a:fontRef>
+        </p:style>
+        <p:txBody>
+          <a:bodyPr rtlCol="0" anchor="ctr"/>
+          <a:lstStyle/>
+          <a:p>
+            <a:pPr algn="ctr"/>
+            <a:endParaRPr lang="en-US"/>
+          </a:p>
+        </p:txBody>
+      </p:sp>
     </p:spTree>
     <p:extLst>
       <p:ext uri="{BB962C8B-B14F-4D97-AF65-F5344CB8AC3E}">
@@ -5492,7 +6638,7 @@
       </p:grpSpPr>
       <p:sp>
         <p:nvSpPr>
-          <p:cNvPr id="2" name=".id(x)">
+          <p:cNvPr id="2" name=".id(cell_1)">
             <a:extLst>
               <a:ext uri="{FF2B5EF4-FFF2-40B4-BE49-F238E27FC236}">
                 <a16:creationId xmlns:a16="http://schemas.microsoft.com/office/drawing/2014/main" id="{FEF7A5EF-AF48-F048-B113-3590856B53E9}"/>
@@ -5896,6 +7042,126 @@
           </a:effectRef>
           <a:fontRef idx="minor">
             <a:schemeClr val="lt1"/>
+          </a:fontRef>
+        </p:style>
+        <p:txBody>
+          <a:bodyPr rtlCol="0" anchor="ctr"/>
+          <a:lstStyle/>
+          <a:p>
+            <a:pPr algn="ctr"/>
+            <a:endParaRPr lang="en-US"/>
+          </a:p>
+        </p:txBody>
+      </p:sp>
+      <p:sp>
+        <p:nvSpPr>
+          <p:cNvPr id="9" name=".id(N5)">
+            <a:extLst>
+              <a:ext uri="{FF2B5EF4-FFF2-40B4-BE49-F238E27FC236}">
+                <a16:creationId xmlns:a16="http://schemas.microsoft.com/office/drawing/2014/main" id="{F5A2A5D2-8E3E-1B4D-AA56-F29FCFD49E6D}"/>
+              </a:ext>
+            </a:extLst>
+          </p:cNvPr>
+          <p:cNvSpPr/>
+          <p:nvPr/>
+        </p:nvSpPr>
+        <p:spPr>
+          <a:xfrm>
+            <a:off x="5093114" y="2725270"/>
+            <a:ext cx="49324" cy="45719"/>
+          </a:xfrm>
+          <a:prstGeom prst="ellipse">
+            <a:avLst/>
+          </a:prstGeom>
+          <a:solidFill>
+            <a:srgbClr val="FF0000"/>
+          </a:solidFill>
+        </p:spPr>
+        <p:style>
+          <a:lnRef idx="2">
+            <a:schemeClr val="accent1">
+              <a:shade val="50000"/>
+            </a:schemeClr>
+          </a:lnRef>
+          <a:fillRef idx="1">
+            <a:schemeClr val="accent1"/>
+          </a:fillRef>
+          <a:effectRef idx="0">
+            <a:schemeClr val="accent1"/>
+          </a:effectRef>
+          <a:fontRef idx="minor">
+            <a:schemeClr val="lt1"/>
+          </a:fontRef>
+        </p:style>
+        <p:txBody>
+          <a:bodyPr rtlCol="0" anchor="ctr"/>
+          <a:lstStyle/>
+          <a:p>
+            <a:pPr algn="ctr"/>
+            <a:endParaRPr lang="en-US"/>
+          </a:p>
+        </p:txBody>
+      </p:sp>
+      <p:sp>
+        <p:nvSpPr>
+          <p:cNvPr id="3" name=".id(L4)">
+            <a:extLst>
+              <a:ext uri="{FF2B5EF4-FFF2-40B4-BE49-F238E27FC236}">
+                <a16:creationId xmlns:a16="http://schemas.microsoft.com/office/drawing/2014/main" id="{3ABD7C89-F717-634E-B3FF-587CEC0D9908}"/>
+              </a:ext>
+            </a:extLst>
+          </p:cNvPr>
+          <p:cNvSpPr/>
+          <p:nvPr/>
+        </p:nvSpPr>
+        <p:spPr>
+          <a:xfrm>
+            <a:off x="5029200" y="2008414"/>
+            <a:ext cx="97971" cy="751115"/>
+          </a:xfrm>
+          <a:custGeom>
+            <a:avLst/>
+            <a:gdLst>
+              <a:gd name="connsiteX0" fmla="*/ 0 w 97971"/>
+              <a:gd name="connsiteY0" fmla="*/ 0 h 751115"/>
+              <a:gd name="connsiteX1" fmla="*/ 97971 w 97971"/>
+              <a:gd name="connsiteY1" fmla="*/ 751115 h 751115"/>
+            </a:gdLst>
+            <a:ahLst/>
+            <a:cxnLst>
+              <a:cxn ang="0">
+                <a:pos x="connsiteX0" y="connsiteY0"/>
+              </a:cxn>
+              <a:cxn ang="0">
+                <a:pos x="connsiteX1" y="connsiteY1"/>
+              </a:cxn>
+            </a:cxnLst>
+            <a:rect l="l" t="t" r="r" b="b"/>
+            <a:pathLst>
+              <a:path w="97971" h="751115">
+                <a:moveTo>
+                  <a:pt x="0" y="0"/>
+                </a:moveTo>
+                <a:lnTo>
+                  <a:pt x="97971" y="751115"/>
+                </a:lnTo>
+              </a:path>
+            </a:pathLst>
+          </a:custGeom>
+          <a:ln w="25400"/>
+        </p:spPr>
+        <p:style>
+          <a:lnRef idx="1">
+            <a:schemeClr val="accent2"/>
+          </a:lnRef>
+          <a:fillRef idx="0">
+            <a:schemeClr val="accent2"/>
+          </a:fillRef>
+          <a:effectRef idx="0">
+            <a:schemeClr val="accent2"/>
+          </a:effectRef>
+          <a:fontRef idx="minor">
+            <a:schemeClr val="tx1"/>
           </a:fontRef>
         </p:style>
         <p:txBody>

</xml_diff>